<commit_message>
Correction to order of time segments in 'by time segment and month' graph
</commit_message>
<xml_diff>
--- a/Uber_rides_and_weather_09072024.pptx
+++ b/Uber_rides_and_weather_09072024.pptx
@@ -20157,36 +20157,6 @@
           </a:p>
         </p:txBody>
       </p:sp>
-      <p:pic>
-        <p:nvPicPr>
-          <p:cNvPr id="9" name="Picture 8" descr="A graph of a bar graph&#10;&#10;Description automatically generated with medium confidence">
-            <a:extLst>
-              <a:ext uri="{FF2B5EF4-FFF2-40B4-BE49-F238E27FC236}">
-                <a16:creationId xmlns:a16="http://schemas.microsoft.com/office/drawing/2014/main" id="{799D9246-4AE9-0F20-EA37-43A620588252}"/>
-              </a:ext>
-            </a:extLst>
-          </p:cNvPr>
-          <p:cNvPicPr>
-            <a:picLocks noChangeAspect="1"/>
-          </p:cNvPicPr>
-          <p:nvPr/>
-        </p:nvPicPr>
-        <p:blipFill>
-          <a:blip r:embed="rId2"/>
-          <a:stretch>
-            <a:fillRect/>
-          </a:stretch>
-        </p:blipFill>
-        <p:spPr>
-          <a:xfrm>
-            <a:off x="1257458" y="2873899"/>
-            <a:ext cx="6266756" cy="3986235"/>
-          </a:xfrm>
-          <a:prstGeom prst="rect">
-            <a:avLst/>
-          </a:prstGeom>
-        </p:spPr>
-      </p:pic>
       <p:sp>
         <p:nvSpPr>
           <p:cNvPr id="11" name="TextBox 10">
@@ -20258,6 +20228,36 @@
           </a:p>
         </p:txBody>
       </p:sp>
+      <p:pic>
+        <p:nvPicPr>
+          <p:cNvPr id="5" name="Picture 4" descr="A graph of different colored bars&#10;&#10;Description automatically generated">
+            <a:extLst>
+              <a:ext uri="{FF2B5EF4-FFF2-40B4-BE49-F238E27FC236}">
+                <a16:creationId xmlns:a16="http://schemas.microsoft.com/office/drawing/2014/main" id="{0C07EF8A-48EC-3CEA-0081-E07652B52271}"/>
+              </a:ext>
+            </a:extLst>
+          </p:cNvPr>
+          <p:cNvPicPr>
+            <a:picLocks noChangeAspect="1"/>
+          </p:cNvPicPr>
+          <p:nvPr/>
+        </p:nvPicPr>
+        <p:blipFill>
+          <a:blip r:embed="rId2"/>
+          <a:stretch>
+            <a:fillRect/>
+          </a:stretch>
+        </p:blipFill>
+        <p:spPr>
+          <a:xfrm>
+            <a:off x="1263186" y="2750038"/>
+            <a:ext cx="6127428" cy="3975984"/>
+          </a:xfrm>
+          <a:prstGeom prst="rect">
+            <a:avLst/>
+          </a:prstGeom>
+        </p:spPr>
+      </p:pic>
     </p:spTree>
     <p:extLst>
       <p:ext uri="{BB962C8B-B14F-4D97-AF65-F5344CB8AC3E}">
@@ -24544,6 +24544,35 @@
 </file>
 
 <file path=customXml/item1.xml><?xml version="1.0" encoding="utf-8"?>
+<p:properties xmlns:p="http://schemas.microsoft.com/office/2006/metadata/properties" xmlns:xsi="http://www.w3.org/2001/XMLSchema-instance" xmlns:pc="http://schemas.microsoft.com/office/infopath/2007/PartnerControls">
+  <documentManagement>
+    <_ip_UnifiedCompliancePolicyUIAction xmlns="http://schemas.microsoft.com/sharepoint/v3" xsi:nil="true"/>
+    <Image xmlns="71af3243-3dd4-4a8d-8c0d-dd76da1f02a5">
+      <Url xsi:nil="true"/>
+      <Description xsi:nil="true"/>
+    </Image>
+    <Status xmlns="71af3243-3dd4-4a8d-8c0d-dd76da1f02a5">Not started</Status>
+    <Background xmlns="71af3243-3dd4-4a8d-8c0d-dd76da1f02a5">false</Background>
+    <_ip_UnifiedCompliancePolicyProperties xmlns="http://schemas.microsoft.com/sharepoint/v3" xsi:nil="true"/>
+    <ImageTagsTaxHTField xmlns="71af3243-3dd4-4a8d-8c0d-dd76da1f02a5">
+      <Terms xmlns="http://schemas.microsoft.com/office/infopath/2007/PartnerControls"/>
+    </ImageTagsTaxHTField>
+    <TaxCatchAll xmlns="230e9df3-be65-4c73-a93b-d1236ebd677e" xsi:nil="true"/>
+    <MediaServiceKeyPoints xmlns="71af3243-3dd4-4a8d-8c0d-dd76da1f02a5" xsi:nil="true"/>
+  </documentManagement>
+</p:properties>
+</file>
+
+<file path=customXml/item2.xml><?xml version="1.0" encoding="utf-8"?>
+<?mso-contentType ?>
+<FormTemplates xmlns="http://schemas.microsoft.com/sharepoint/v3/contenttype/forms">
+  <Display>DocumentLibraryForm</Display>
+  <Edit>DocumentLibraryForm</Edit>
+  <New>DocumentLibraryForm</New>
+</FormTemplates>
+</file>
+
+<file path=customXml/item3.xml><?xml version="1.0" encoding="utf-8"?>
 <ct:contentTypeSchema xmlns:ct="http://schemas.microsoft.com/office/2006/metadata/contentType" xmlns:ma="http://schemas.microsoft.com/office/2006/metadata/properties/metaAttributes" ct:_="" ma:_="" ma:contentTypeName="Document" ma:contentTypeID="0x01010079F111ED35F8CC479449609E8A0923A6" ma:contentTypeVersion="28" ma:contentTypeDescription="Create a new document." ma:contentTypeScope="" ma:versionID="60f5a4f2d2b0abadcf532d48ebf9cb71">
   <xsd:schema xmlns:xsd="http://www.w3.org/2001/XMLSchema" xmlns:xs="http://www.w3.org/2001/XMLSchema" xmlns:p="http://schemas.microsoft.com/office/2006/metadata/properties" xmlns:ns1="http://schemas.microsoft.com/sharepoint/v3" xmlns:ns2="71af3243-3dd4-4a8d-8c0d-dd76da1f02a5" xmlns:ns3="16c05727-aa75-4e4a-9b5f-8a80a1165891" xmlns:ns4="230e9df3-be65-4c73-a93b-d1236ebd677e" targetNamespace="http://schemas.microsoft.com/office/2006/metadata/properties" ma:root="true" ma:fieldsID="7dd78129e6a1811f84807ad11c651531" ns1:_="" ns2:_="" ns3:_="" ns4:_="">
     <xsd:import namespace="http://schemas.microsoft.com/sharepoint/v3"/>
@@ -24855,36 +24884,27 @@
 </ct:contentTypeSchema>
 </file>
 
-<file path=customXml/item2.xml><?xml version="1.0" encoding="utf-8"?>
-<p:properties xmlns:p="http://schemas.microsoft.com/office/2006/metadata/properties" xmlns:xsi="http://www.w3.org/2001/XMLSchema-instance" xmlns:pc="http://schemas.microsoft.com/office/infopath/2007/PartnerControls">
-  <documentManagement>
-    <_ip_UnifiedCompliancePolicyUIAction xmlns="http://schemas.microsoft.com/sharepoint/v3" xsi:nil="true"/>
-    <Image xmlns="71af3243-3dd4-4a8d-8c0d-dd76da1f02a5">
-      <Url xsi:nil="true"/>
-      <Description xsi:nil="true"/>
-    </Image>
-    <Status xmlns="71af3243-3dd4-4a8d-8c0d-dd76da1f02a5">Not started</Status>
-    <Background xmlns="71af3243-3dd4-4a8d-8c0d-dd76da1f02a5">false</Background>
-    <_ip_UnifiedCompliancePolicyProperties xmlns="http://schemas.microsoft.com/sharepoint/v3" xsi:nil="true"/>
-    <ImageTagsTaxHTField xmlns="71af3243-3dd4-4a8d-8c0d-dd76da1f02a5">
-      <Terms xmlns="http://schemas.microsoft.com/office/infopath/2007/PartnerControls"/>
-    </ImageTagsTaxHTField>
-    <TaxCatchAll xmlns="230e9df3-be65-4c73-a93b-d1236ebd677e" xsi:nil="true"/>
-    <MediaServiceKeyPoints xmlns="71af3243-3dd4-4a8d-8c0d-dd76da1f02a5" xsi:nil="true"/>
-  </documentManagement>
-</p:properties>
+<file path=customXml/itemProps1.xml><?xml version="1.0" encoding="utf-8"?>
+<ds:datastoreItem xmlns:ds="http://schemas.openxmlformats.org/officeDocument/2006/customXml" ds:itemID="{BA719FA4-954C-4FA8-82CB-206659C3B826}">
+  <ds:schemaRefs>
+    <ds:schemaRef ds:uri="http://schemas.microsoft.com/office/2006/metadata/properties"/>
+    <ds:schemaRef ds:uri="http://schemas.microsoft.com/office/infopath/2007/PartnerControls"/>
+    <ds:schemaRef ds:uri="http://schemas.microsoft.com/sharepoint/v3"/>
+    <ds:schemaRef ds:uri="71af3243-3dd4-4a8d-8c0d-dd76da1f02a5"/>
+    <ds:schemaRef ds:uri="230e9df3-be65-4c73-a93b-d1236ebd677e"/>
+  </ds:schemaRefs>
+</ds:datastoreItem>
 </file>
 
-<file path=customXml/item3.xml><?xml version="1.0" encoding="utf-8"?>
-<?mso-contentType ?>
-<FormTemplates xmlns="http://schemas.microsoft.com/sharepoint/v3/contenttype/forms">
-  <Display>DocumentLibraryForm</Display>
-  <Edit>DocumentLibraryForm</Edit>
-  <New>DocumentLibraryForm</New>
-</FormTemplates>
+<file path=customXml/itemProps2.xml><?xml version="1.0" encoding="utf-8"?>
+<ds:datastoreItem xmlns:ds="http://schemas.openxmlformats.org/officeDocument/2006/customXml" ds:itemID="{16DBB56F-4362-4386-A1A1-3DF898896616}">
+  <ds:schemaRefs>
+    <ds:schemaRef ds:uri="http://schemas.microsoft.com/sharepoint/v3/contenttype/forms"/>
+  </ds:schemaRefs>
+</ds:datastoreItem>
 </file>
 
-<file path=customXml/itemProps1.xml><?xml version="1.0" encoding="utf-8"?>
+<file path=customXml/itemProps3.xml><?xml version="1.0" encoding="utf-8"?>
 <ds:datastoreItem xmlns:ds="http://schemas.openxmlformats.org/officeDocument/2006/customXml" ds:itemID="{04948363-B267-4BAC-8655-100FBEC280C1}">
   <ds:schemaRefs>
     <ds:schemaRef ds:uri="http://schemas.microsoft.com/office/2006/metadata/contentType"/>
@@ -24905,26 +24925,6 @@
 </ds:datastoreItem>
 </file>
 
-<file path=customXml/itemProps2.xml><?xml version="1.0" encoding="utf-8"?>
-<ds:datastoreItem xmlns:ds="http://schemas.openxmlformats.org/officeDocument/2006/customXml" ds:itemID="{BA719FA4-954C-4FA8-82CB-206659C3B826}">
-  <ds:schemaRefs>
-    <ds:schemaRef ds:uri="http://schemas.microsoft.com/office/2006/metadata/properties"/>
-    <ds:schemaRef ds:uri="http://schemas.microsoft.com/office/infopath/2007/PartnerControls"/>
-    <ds:schemaRef ds:uri="http://schemas.microsoft.com/sharepoint/v3"/>
-    <ds:schemaRef ds:uri="71af3243-3dd4-4a8d-8c0d-dd76da1f02a5"/>
-    <ds:schemaRef ds:uri="230e9df3-be65-4c73-a93b-d1236ebd677e"/>
-  </ds:schemaRefs>
-</ds:datastoreItem>
-</file>
-
-<file path=customXml/itemProps3.xml><?xml version="1.0" encoding="utf-8"?>
-<ds:datastoreItem xmlns:ds="http://schemas.openxmlformats.org/officeDocument/2006/customXml" ds:itemID="{16DBB56F-4362-4386-A1A1-3DF898896616}">
-  <ds:schemaRefs>
-    <ds:schemaRef ds:uri="http://schemas.microsoft.com/sharepoint/v3/contenttype/forms"/>
-  </ds:schemaRefs>
-</ds:datastoreItem>
-</file>
-
 <file path=docMetadata/LabelInfo.xml><?xml version="1.0" encoding="utf-8"?>
 <clbl:labelList xmlns:clbl="http://schemas.microsoft.com/office/2020/mipLabelMetadata"/>
 </file>
</xml_diff>